<commit_message>
Update through to Lecture 3
</commit_message>
<xml_diff>
--- a/docs/Lecture1.pptx
+++ b/docs/Lecture1.pptx
@@ -3079,7 +3079,7 @@
           <a:p>
             <a:r>
               <a:rPr lang="en-GB" dirty="0"/>
-              <a:t>PSYC003: Psychological influences on Health and Behaviour: Lecture 1</a:t>
+              <a:t>Science, Truth, and Honesty</a:t>
             </a:r>
           </a:p>
         </p:txBody>
@@ -3102,25 +3102,13 @@
         </p:spPr>
         <p:txBody>
           <a:bodyPr>
-            <a:normAutofit lnSpcReduction="10000"/>
+            <a:normAutofit/>
           </a:bodyPr>
           <a:lstStyle/>
           <a:p>
             <a:r>
               <a:rPr lang="en-GB" dirty="0"/>
-              <a:t>Prof Tim Hollins</a:t>
-            </a:r>
-          </a:p>
-          <a:p>
-            <a:r>
-              <a:rPr lang="en-GB" dirty="0"/>
-              <a:t>PSQ A219</a:t>
-            </a:r>
-          </a:p>
-          <a:p>
-            <a:r>
-              <a:rPr lang="en-GB" dirty="0"/>
-              <a:t>Office hours: Fridays 10-1pm</a:t>
+              <a:t>Prof. Andy Wills</a:t>
             </a:r>
           </a:p>
           <a:p>
@@ -3128,12 +3116,9 @@
               <a:rPr lang="en-GB" dirty="0">
                 <a:hlinkClick r:id="rId3"/>
               </a:rPr>
-              <a:t>https://dle.plymouth.ac.uk/mod/scheduler/view.php?id=1402630</a:t>
-            </a:r>
-            <a:r>
-              <a:rPr lang="en-GB" dirty="0"/>
-              <a:t> </a:t>
-            </a:r>
+              <a:t>https://calendly.com/andy-wills/15-min-office-hour-appointment</a:t>
+            </a:r>
+            <a:endParaRPr lang="en-GB" dirty="0"/>
           </a:p>
         </p:txBody>
       </p:sp>
@@ -5718,7 +5703,7 @@
         <p:spPr/>
         <p:txBody>
           <a:bodyPr>
-            <a:normAutofit fontScale="85000" lnSpcReduction="20000"/>
+            <a:normAutofit/>
           </a:bodyPr>
           <a:lstStyle/>
           <a:p>
@@ -5740,144 +5725,34 @@
             </a:pPr>
             <a:r>
               <a:rPr lang="en-GB" dirty="0"/>
-              <a:t>12 x 2 hour lectures (</a:t>
-            </a:r>
-            <a:r>
-              <a:rPr lang="en-GB" dirty="0">
-                <a:solidFill>
-                  <a:srgbClr val="FF0000"/>
-                </a:solidFill>
-              </a:rPr>
-              <a:t>Tues 11-1, </a:t>
-            </a:r>
-            <a:r>
-              <a:rPr lang="en-GB" dirty="0" err="1">
-                <a:solidFill>
-                  <a:srgbClr val="FF0000"/>
-                </a:solidFill>
-              </a:rPr>
-              <a:t>Emdeck</a:t>
-            </a:r>
-            <a:r>
-              <a:rPr lang="en-GB" dirty="0">
-                <a:solidFill>
-                  <a:srgbClr val="FF0000"/>
-                </a:solidFill>
-              </a:rPr>
-              <a:t> 207</a:t>
-            </a:r>
-            <a:r>
-              <a:rPr lang="en-GB" dirty="0"/>
-              <a:t>)			</a:t>
-            </a:r>
-          </a:p>
-          <a:p>
-            <a:pPr marL="0" indent="0">
-              <a:buNone/>
-            </a:pPr>
-            <a:r>
-              <a:rPr lang="en-GB" dirty="0"/>
-              <a:t>12 x 1 hour workshops (</a:t>
-            </a:r>
-            <a:r>
-              <a:rPr lang="en-GB" dirty="0">
-                <a:solidFill>
-                  <a:srgbClr val="FF0000"/>
-                </a:solidFill>
-              </a:rPr>
-              <a:t>Thurs 4-6 </a:t>
-            </a:r>
-            <a:r>
-              <a:rPr lang="en-GB" dirty="0" err="1">
-                <a:solidFill>
-                  <a:srgbClr val="FF0000"/>
-                </a:solidFill>
-              </a:rPr>
-              <a:t>Cookworthy</a:t>
-            </a:r>
-            <a:r>
-              <a:rPr lang="en-GB" dirty="0">
-                <a:solidFill>
-                  <a:srgbClr val="FF0000"/>
-                </a:solidFill>
-              </a:rPr>
-              <a:t> shared with PSYC004</a:t>
-            </a:r>
-            <a:r>
-              <a:rPr lang="en-GB" dirty="0"/>
-              <a:t>)	</a:t>
-            </a:r>
-          </a:p>
-          <a:p>
-            <a:pPr marL="0" indent="0">
-              <a:buNone/>
-            </a:pPr>
-            <a:r>
-              <a:rPr lang="en-GB" dirty="0"/>
-              <a:t>3 x 1 hour tutorials (</a:t>
-            </a:r>
-            <a:r>
-              <a:rPr lang="en-GB" dirty="0">
-                <a:solidFill>
-                  <a:srgbClr val="FF0000"/>
-                </a:solidFill>
-              </a:rPr>
-              <a:t>NOT ON TIMETABLE</a:t>
-            </a:r>
-            <a:r>
-              <a:rPr lang="en-GB" dirty="0"/>
-              <a:t>)</a:t>
-            </a:r>
-          </a:p>
-          <a:p>
-            <a:pPr marL="0" indent="0">
-              <a:buNone/>
-            </a:pPr>
-            <a:r>
-              <a:rPr lang="en-GB" dirty="0"/>
-              <a:t>	2</a:t>
-            </a:r>
-            <a:r>
-              <a:rPr lang="en-GB" baseline="30000" dirty="0"/>
-              <a:t>nd</a:t>
-            </a:r>
-            <a:r>
-              <a:rPr lang="en-GB" dirty="0"/>
-              <a:t> February</a:t>
-            </a:r>
-          </a:p>
-          <a:p>
-            <a:pPr marL="0" indent="0">
-              <a:buNone/>
-            </a:pPr>
-            <a:r>
-              <a:rPr lang="en-GB" dirty="0"/>
-              <a:t>	16</a:t>
-            </a:r>
-            <a:r>
-              <a:rPr lang="en-GB" baseline="30000" dirty="0"/>
-              <a:t>th</a:t>
-            </a:r>
-            <a:r>
-              <a:rPr lang="en-GB" dirty="0"/>
-              <a:t> February</a:t>
-            </a:r>
-          </a:p>
-          <a:p>
-            <a:pPr marL="0" indent="0">
-              <a:buNone/>
-            </a:pPr>
-            <a:r>
-              <a:rPr lang="en-GB" dirty="0"/>
-              <a:t>	11</a:t>
-            </a:r>
-            <a:r>
-              <a:rPr lang="en-GB" baseline="30000" dirty="0"/>
-              <a:t>th</a:t>
-            </a:r>
-            <a:r>
-              <a:rPr lang="en-GB" dirty="0"/>
-              <a:t> May</a:t>
+              <a:t>12 x 2 hour lectures 			</a:t>
+            </a:r>
+          </a:p>
+          <a:p>
+            <a:pPr marL="0" indent="0">
+              <a:buNone/>
+            </a:pPr>
+            <a:r>
+              <a:rPr lang="en-GB" dirty="0"/>
+              <a:t>12 x 1 hour workshops 	</a:t>
+            </a:r>
+          </a:p>
+          <a:p>
+            <a:pPr marL="0" indent="0">
+              <a:buNone/>
+            </a:pPr>
+            <a:r>
+              <a:rPr lang="en-GB" dirty="0"/>
+              <a:t>3 x 1 hour tutorials </a:t>
+            </a:r>
+          </a:p>
+          <a:p>
+            <a:pPr marL="0" indent="0">
+              <a:buNone/>
+            </a:pPr>
+            <a:r>
+              <a:rPr lang="en-GB" dirty="0"/>
+              <a:t>	</a:t>
             </a:r>
           </a:p>
           <a:p>
@@ -5895,33 +5770,16 @@
             </a:pPr>
             <a:r>
               <a:rPr lang="en-GB" dirty="0"/>
-              <a:t>	Prof Tim Hollins</a:t>
-            </a:r>
-          </a:p>
-          <a:p>
-            <a:pPr marL="0" indent="0">
-              <a:buNone/>
-            </a:pPr>
-            <a:r>
-              <a:rPr lang="en-GB" dirty="0"/>
-              <a:t>	Dr Sonja Heinz</a:t>
-            </a:r>
-          </a:p>
-          <a:p>
-            <a:pPr marL="0" indent="0">
-              <a:buNone/>
-            </a:pPr>
-            <a:r>
-              <a:rPr lang="en-GB" dirty="0"/>
-              <a:t>	Dr Robert Heirene (from March 1</a:t>
-            </a:r>
-            <a:r>
-              <a:rPr lang="en-GB" baseline="30000" dirty="0"/>
-              <a:t>st</a:t>
-            </a:r>
-            <a:r>
-              <a:rPr lang="en-GB" dirty="0"/>
-              <a:t>)</a:t>
+              <a:t>	Prof. Tim Hollins</a:t>
+            </a:r>
+          </a:p>
+          <a:p>
+            <a:pPr marL="0" indent="0">
+              <a:buNone/>
+            </a:pPr>
+            <a:r>
+              <a:rPr lang="en-GB" dirty="0"/>
+              <a:t>	Prof. Mark Tarrant</a:t>
             </a:r>
           </a:p>
           <a:p>

</xml_diff>